<commit_message>
Tweaks to website and update of presentation Deepa
</commit_message>
<xml_diff>
--- a/Telecom Customer Churn - Presentation.pptx
+++ b/Telecom Customer Churn - Presentation.pptx
@@ -8,17 +8,17 @@
     <p:sldMasterId id="2147483723" r:id="rId4"/>
   </p:sldMasterIdLst>
   <p:notesMasterIdLst>
-    <p:notesMasterId r:id="rId37"/>
+    <p:notesMasterId r:id="rId38"/>
   </p:notesMasterIdLst>
   <p:sldIdLst>
     <p:sldId id="257" r:id="rId5"/>
     <p:sldId id="258" r:id="rId6"/>
     <p:sldId id="277" r:id="rId7"/>
     <p:sldId id="259" r:id="rId8"/>
-    <p:sldId id="294" r:id="rId9"/>
-    <p:sldId id="295" r:id="rId10"/>
-    <p:sldId id="296" r:id="rId11"/>
-    <p:sldId id="260" r:id="rId12"/>
+    <p:sldId id="260" r:id="rId9"/>
+    <p:sldId id="294" r:id="rId10"/>
+    <p:sldId id="295" r:id="rId11"/>
+    <p:sldId id="296" r:id="rId12"/>
     <p:sldId id="278" r:id="rId13"/>
     <p:sldId id="280" r:id="rId14"/>
     <p:sldId id="281" r:id="rId15"/>
@@ -39,10 +39,11 @@
     <p:sldId id="285" r:id="rId30"/>
     <p:sldId id="292" r:id="rId31"/>
     <p:sldId id="293" r:id="rId32"/>
-    <p:sldId id="274" r:id="rId33"/>
-    <p:sldId id="288" r:id="rId34"/>
-    <p:sldId id="276" r:id="rId35"/>
-    <p:sldId id="291" r:id="rId36"/>
+    <p:sldId id="298" r:id="rId33"/>
+    <p:sldId id="274" r:id="rId34"/>
+    <p:sldId id="288" r:id="rId35"/>
+    <p:sldId id="276" r:id="rId36"/>
+    <p:sldId id="291" r:id="rId37"/>
   </p:sldIdLst>
   <p:sldSz cx="12192000" cy="6858000"/>
   <p:notesSz cx="6858000" cy="9144000"/>
@@ -150,10 +151,10 @@
             <p14:sldId id="258"/>
             <p14:sldId id="277"/>
             <p14:sldId id="259"/>
+            <p14:sldId id="260"/>
             <p14:sldId id="294"/>
             <p14:sldId id="295"/>
             <p14:sldId id="296"/>
-            <p14:sldId id="260"/>
             <p14:sldId id="278"/>
           </p14:sldIdLst>
         </p14:section>
@@ -194,6 +195,7 @@
             <p14:sldId id="285"/>
             <p14:sldId id="292"/>
             <p14:sldId id="293"/>
+            <p14:sldId id="298"/>
           </p14:sldIdLst>
         </p14:section>
         <p14:section name="General Closing" id="{4AB6C702-EE4D-4283-ACB0-770710E41AE6}">
@@ -219,6 +221,7 @@
 <file path=ppt/revisionInfo.xml><?xml version="1.0" encoding="utf-8"?>
 <p1510:revInfo xmlns:a="http://schemas.openxmlformats.org/drawingml/2006/main" xmlns:r="http://schemas.openxmlformats.org/officeDocument/2006/relationships" xmlns:p1510="http://schemas.microsoft.com/office/powerpoint/2015/10/main">
   <p1510:revLst>
+    <p1510:client id="{0CE8A5F7-92B1-46A5-8332-1EBAD2FBC191}" v="2" dt="2022-10-16T23:15:52.706"/>
     <p1510:client id="{E8AB9CB6-2101-4549-960E-33CAD8E46830}" v="525" dt="2022-10-16T19:11:46.691"/>
   </p1510:revLst>
 </p1510:revInfo>
@@ -226,6 +229,76 @@
 
 <file path=ppt/changesInfos/changesInfo1.xml><?xml version="1.0" encoding="utf-8"?>
 <pc:chgInfo xmlns:a="http://schemas.openxmlformats.org/drawingml/2006/main" xmlns:r="http://schemas.openxmlformats.org/officeDocument/2006/relationships" xmlns:ac="http://schemas.microsoft.com/office/drawing/2013/main/command" xmlns:pc="http://schemas.microsoft.com/office/powerpoint/2013/main/command">
+  <pc:docChgLst>
+    <pc:chgData name="deepa nair" userId="754ec774447e2cd8" providerId="LiveId" clId="{0CE8A5F7-92B1-46A5-8332-1EBAD2FBC191}"/>
+    <pc:docChg chg="custSel addSld modSld sldOrd modSection">
+      <pc:chgData name="deepa nair" userId="754ec774447e2cd8" providerId="LiveId" clId="{0CE8A5F7-92B1-46A5-8332-1EBAD2FBC191}" dt="2022-10-16T23:17:33.820" v="129" actId="20577"/>
+      <pc:docMkLst>
+        <pc:docMk/>
+      </pc:docMkLst>
+      <pc:sldChg chg="modSp mod">
+        <pc:chgData name="deepa nair" userId="754ec774447e2cd8" providerId="LiveId" clId="{0CE8A5F7-92B1-46A5-8332-1EBAD2FBC191}" dt="2022-10-16T23:17:33.820" v="129" actId="20577"/>
+        <pc:sldMkLst>
+          <pc:docMk/>
+          <pc:sldMk cId="3369225394" sldId="259"/>
+        </pc:sldMkLst>
+        <pc:spChg chg="mod">
+          <ac:chgData name="deepa nair" userId="754ec774447e2cd8" providerId="LiveId" clId="{0CE8A5F7-92B1-46A5-8332-1EBAD2FBC191}" dt="2022-10-16T23:17:33.820" v="129" actId="20577"/>
+          <ac:spMkLst>
+            <pc:docMk/>
+            <pc:sldMk cId="3369225394" sldId="259"/>
+            <ac:spMk id="3" creationId="{00000000-0000-0000-0000-000000000000}"/>
+          </ac:spMkLst>
+        </pc:spChg>
+      </pc:sldChg>
+      <pc:sldChg chg="ord">
+        <pc:chgData name="deepa nair" userId="754ec774447e2cd8" providerId="LiveId" clId="{0CE8A5F7-92B1-46A5-8332-1EBAD2FBC191}" dt="2022-10-16T23:16:11.341" v="21"/>
+        <pc:sldMkLst>
+          <pc:docMk/>
+          <pc:sldMk cId="1575721539" sldId="260"/>
+        </pc:sldMkLst>
+      </pc:sldChg>
+      <pc:sldChg chg="addSp delSp modSp new mod">
+        <pc:chgData name="deepa nair" userId="754ec774447e2cd8" providerId="LiveId" clId="{0CE8A5F7-92B1-46A5-8332-1EBAD2FBC191}" dt="2022-10-16T23:16:00.244" v="19" actId="1076"/>
+        <pc:sldMkLst>
+          <pc:docMk/>
+          <pc:sldMk cId="1942785552" sldId="298"/>
+        </pc:sldMkLst>
+        <pc:spChg chg="mod">
+          <ac:chgData name="deepa nair" userId="754ec774447e2cd8" providerId="LiveId" clId="{0CE8A5F7-92B1-46A5-8332-1EBAD2FBC191}" dt="2022-10-16T23:14:40.634" v="7" actId="20577"/>
+          <ac:spMkLst>
+            <pc:docMk/>
+            <pc:sldMk cId="1942785552" sldId="298"/>
+            <ac:spMk id="2" creationId="{76FDA1C1-871D-E241-95D6-29032D6C74FE}"/>
+          </ac:spMkLst>
+        </pc:spChg>
+        <pc:spChg chg="del">
+          <ac:chgData name="deepa nair" userId="754ec774447e2cd8" providerId="LiveId" clId="{0CE8A5F7-92B1-46A5-8332-1EBAD2FBC191}" dt="2022-10-16T23:15:02.485" v="8"/>
+          <ac:spMkLst>
+            <pc:docMk/>
+            <pc:sldMk cId="1942785552" sldId="298"/>
+            <ac:spMk id="3" creationId="{350C6B99-6EDF-D1EF-6492-6A2DEF21BDE6}"/>
+          </ac:spMkLst>
+        </pc:spChg>
+        <pc:picChg chg="add mod">
+          <ac:chgData name="deepa nair" userId="754ec774447e2cd8" providerId="LiveId" clId="{0CE8A5F7-92B1-46A5-8332-1EBAD2FBC191}" dt="2022-10-16T23:16:00.244" v="19" actId="1076"/>
+          <ac:picMkLst>
+            <pc:docMk/>
+            <pc:sldMk cId="1942785552" sldId="298"/>
+            <ac:picMk id="4" creationId="{650F6E8A-0541-0402-BD6D-98630F5DBF4C}"/>
+          </ac:picMkLst>
+        </pc:picChg>
+        <pc:picChg chg="add mod">
+          <ac:chgData name="deepa nair" userId="754ec774447e2cd8" providerId="LiveId" clId="{0CE8A5F7-92B1-46A5-8332-1EBAD2FBC191}" dt="2022-10-16T23:15:58.963" v="18" actId="14100"/>
+          <ac:picMkLst>
+            <pc:docMk/>
+            <pc:sldMk cId="1942785552" sldId="298"/>
+            <ac:picMk id="5" creationId="{256BA277-4F05-B1D1-3CC7-7A78091466AE}"/>
+          </ac:picMkLst>
+        </pc:picChg>
+      </pc:sldChg>
+    </pc:docChg>
+  </pc:docChgLst>
   <pc:docChgLst>
     <pc:chgData name="Jeya Emmanuel" userId="28e79deefdbe506a" providerId="LiveId" clId="{E8AB9CB6-2101-4549-960E-33CAD8E46830}"/>
     <pc:docChg chg="undo redo custSel addSld delSld modSld sldOrd addMainMaster delMainMaster modMainMaster addSection delSection modSection">
@@ -4185,7 +4258,7 @@
           <a:p>
             <a:fld id="{A7666ED7-631A-46AF-B451-227D0A8685A0}" type="slidenum">
               <a:rPr lang="en-US"/>
-              <a:t>29</a:t>
+              <a:t>30</a:t>
             </a:fld>
             <a:endParaRPr lang="en-US"/>
           </a:p>
@@ -4269,7 +4342,7 @@
           <a:p>
             <a:fld id="{A7666ED7-631A-46AF-B451-227D0A8685A0}" type="slidenum">
               <a:rPr lang="en-US"/>
-              <a:t>31</a:t>
+              <a:t>32</a:t>
             </a:fld>
             <a:endParaRPr lang="en-US"/>
           </a:p>
@@ -4353,7 +4426,7 @@
           <a:p>
             <a:fld id="{B37B1F30-39B2-4CE2-8EF3-91F3179569A5}" type="slidenum">
               <a:rPr lang="en-US" smtClean="0"/>
-              <a:t>32</a:t>
+              <a:t>33</a:t>
             </a:fld>
             <a:endParaRPr lang="en-US"/>
           </a:p>
@@ -4605,7 +4678,7 @@
           <a:p>
             <a:fld id="{A7666ED7-631A-46AF-B451-227D0A8685A0}" type="slidenum">
               <a:rPr lang="en-US"/>
-              <a:t>8</a:t>
+              <a:t>5</a:t>
             </a:fld>
             <a:endParaRPr lang="en-US"/>
           </a:p>
@@ -39716,12 +39789,18 @@
       </p:grpSpPr>
       <p:sp>
         <p:nvSpPr>
-          <p:cNvPr id="2" name="Title 1"/>
-          <p:cNvSpPr>
-            <a:spLocks noGrp="1"/>
-          </p:cNvSpPr>
-          <p:nvPr>
-            <p:ph type="ctrTitle"/>
+          <p:cNvPr id="2" name="Title 1">
+            <a:extLst>
+              <a:ext uri="{FF2B5EF4-FFF2-40B4-BE49-F238E27FC236}">
+                <a16:creationId xmlns:a16="http://schemas.microsoft.com/office/drawing/2014/main" id="{76FDA1C1-871D-E241-95D6-29032D6C74FE}"/>
+              </a:ext>
+            </a:extLst>
+          </p:cNvPr>
+          <p:cNvSpPr>
+            <a:spLocks noGrp="1"/>
+          </p:cNvSpPr>
+          <p:nvPr>
+            <p:ph type="title"/>
           </p:nvPr>
         </p:nvSpPr>
         <p:spPr/>
@@ -39730,38 +39809,78 @@
           <a:lstStyle/>
           <a:p>
             <a:r>
-              <a:rPr lang="en-US"/>
-              <a:t>Project Summary</a:t>
-            </a:r>
-          </a:p>
-        </p:txBody>
-      </p:sp>
-      <p:sp>
-        <p:nvSpPr>
-          <p:cNvPr id="3" name="Subtitle 2"/>
-          <p:cNvSpPr>
-            <a:spLocks noGrp="1"/>
-          </p:cNvSpPr>
-          <p:nvPr>
-            <p:ph type="subTitle" idx="1"/>
-          </p:nvPr>
-        </p:nvSpPr>
-        <p:spPr/>
-        <p:txBody>
-          <a:bodyPr/>
-          <a:lstStyle/>
-          <a:p>
-            <a:r>
-              <a:rPr lang="en-US" dirty="0"/>
-              <a:t>Optional statement</a:t>
-            </a:r>
-          </a:p>
-        </p:txBody>
-      </p:sp>
+              <a:rPr lang="en-AU" dirty="0"/>
+              <a:t>Results</a:t>
+            </a:r>
+          </a:p>
+        </p:txBody>
+      </p:sp>
+      <p:pic>
+        <p:nvPicPr>
+          <p:cNvPr id="4" name="Content Placeholder 3" descr="Chart, treemap chart&#10;&#10;Description automatically generated">
+            <a:extLst>
+              <a:ext uri="{FF2B5EF4-FFF2-40B4-BE49-F238E27FC236}">
+                <a16:creationId xmlns:a16="http://schemas.microsoft.com/office/drawing/2014/main" id="{650F6E8A-0541-0402-BD6D-98630F5DBF4C}"/>
+              </a:ext>
+            </a:extLst>
+          </p:cNvPr>
+          <p:cNvPicPr>
+            <a:picLocks noGrp="1" noChangeAspect="1"/>
+          </p:cNvPicPr>
+          <p:nvPr>
+            <p:ph idx="1"/>
+          </p:nvPr>
+        </p:nvPicPr>
+        <p:blipFill>
+          <a:blip r:embed="rId2"/>
+          <a:stretch>
+            <a:fillRect/>
+          </a:stretch>
+        </p:blipFill>
+        <p:spPr>
+          <a:xfrm>
+            <a:off x="196771" y="2025568"/>
+            <a:ext cx="5899230" cy="4844005"/>
+          </a:xfrm>
+          <a:prstGeom prst="rect">
+            <a:avLst/>
+          </a:prstGeom>
+        </p:spPr>
+      </p:pic>
+      <p:pic>
+        <p:nvPicPr>
+          <p:cNvPr id="5" name="Picture 4">
+            <a:extLst>
+              <a:ext uri="{FF2B5EF4-FFF2-40B4-BE49-F238E27FC236}">
+                <a16:creationId xmlns:a16="http://schemas.microsoft.com/office/drawing/2014/main" id="{256BA277-4F05-B1D1-3CC7-7A78091466AE}"/>
+              </a:ext>
+            </a:extLst>
+          </p:cNvPr>
+          <p:cNvPicPr>
+            <a:picLocks noChangeAspect="1"/>
+          </p:cNvPicPr>
+          <p:nvPr/>
+        </p:nvPicPr>
+        <p:blipFill>
+          <a:blip r:embed="rId3"/>
+          <a:stretch>
+            <a:fillRect/>
+          </a:stretch>
+        </p:blipFill>
+        <p:spPr>
+          <a:xfrm>
+            <a:off x="6246531" y="3141743"/>
+            <a:ext cx="5648325" cy="2471979"/>
+          </a:xfrm>
+          <a:prstGeom prst="rect">
+            <a:avLst/>
+          </a:prstGeom>
+        </p:spPr>
+      </p:pic>
     </p:spTree>
     <p:extLst>
       <p:ext uri="{BB962C8B-B14F-4D97-AF65-F5344CB8AC3E}">
-        <p14:creationId xmlns:p14="http://schemas.microsoft.com/office/powerpoint/2010/main" val="3589653851"/>
+        <p14:creationId xmlns:p14="http://schemas.microsoft.com/office/powerpoint/2010/main" val="1942785552"/>
       </p:ext>
     </p:extLst>
   </p:cSld>
@@ -39985,18 +40104,12 @@
       </p:grpSpPr>
       <p:sp>
         <p:nvSpPr>
-          <p:cNvPr id="2" name="Title 1">
-            <a:extLst>
-              <a:ext uri="{FF2B5EF4-FFF2-40B4-BE49-F238E27FC236}">
-                <a16:creationId xmlns:a16="http://schemas.microsoft.com/office/drawing/2014/main" id="{52DF2A18-C538-D150-4407-6243CF1E0C5A}"/>
-              </a:ext>
-            </a:extLst>
-          </p:cNvPr>
-          <p:cNvSpPr>
-            <a:spLocks noGrp="1"/>
-          </p:cNvSpPr>
-          <p:nvPr>
-            <p:ph type="title"/>
+          <p:cNvPr id="2" name="Title 1"/>
+          <p:cNvSpPr>
+            <a:spLocks noGrp="1"/>
+          </p:cNvSpPr>
+          <p:nvPr>
+            <p:ph type="ctrTitle"/>
           </p:nvPr>
         </p:nvSpPr>
         <p:spPr/>
@@ -40005,115 +40118,30 @@
           <a:lstStyle/>
           <a:p>
             <a:r>
+              <a:rPr lang="en-US"/>
+              <a:t>Project Summary</a:t>
+            </a:r>
+          </a:p>
+        </p:txBody>
+      </p:sp>
+      <p:sp>
+        <p:nvSpPr>
+          <p:cNvPr id="3" name="Subtitle 2"/>
+          <p:cNvSpPr>
+            <a:spLocks noGrp="1"/>
+          </p:cNvSpPr>
+          <p:nvPr>
+            <p:ph type="subTitle" idx="1"/>
+          </p:nvPr>
+        </p:nvSpPr>
+        <p:spPr/>
+        <p:txBody>
+          <a:bodyPr/>
+          <a:lstStyle/>
+          <a:p>
+            <a:r>
               <a:rPr lang="en-US" dirty="0"/>
-              <a:t>Conclusion</a:t>
-            </a:r>
-            <a:endParaRPr lang="en-AU" dirty="0"/>
-          </a:p>
-        </p:txBody>
-      </p:sp>
-      <p:pic>
-        <p:nvPicPr>
-          <p:cNvPr id="4" name="Picture 3">
-            <a:extLst>
-              <a:ext uri="{FF2B5EF4-FFF2-40B4-BE49-F238E27FC236}">
-                <a16:creationId xmlns:a16="http://schemas.microsoft.com/office/drawing/2014/main" id="{F02CE017-A968-4309-12CB-E806EA58E2A4}"/>
-              </a:ext>
-            </a:extLst>
-          </p:cNvPr>
-          <p:cNvPicPr>
-            <a:picLocks noChangeAspect="1"/>
-          </p:cNvPicPr>
-          <p:nvPr/>
-        </p:nvPicPr>
-        <p:blipFill>
-          <a:blip r:embed="rId2"/>
-          <a:stretch>
-            <a:fillRect/>
-          </a:stretch>
-        </p:blipFill>
-        <p:spPr>
-          <a:xfrm>
-            <a:off x="792677" y="2440300"/>
-            <a:ext cx="4668580" cy="2710434"/>
-          </a:xfrm>
-          <a:prstGeom prst="rect">
-            <a:avLst/>
-          </a:prstGeom>
-        </p:spPr>
-      </p:pic>
-      <p:pic>
-        <p:nvPicPr>
-          <p:cNvPr id="5" name="Picture 4">
-            <a:extLst>
-              <a:ext uri="{FF2B5EF4-FFF2-40B4-BE49-F238E27FC236}">
-                <a16:creationId xmlns:a16="http://schemas.microsoft.com/office/drawing/2014/main" id="{855D99B0-EE8F-6614-26F2-2BF70F743465}"/>
-              </a:ext>
-            </a:extLst>
-          </p:cNvPr>
-          <p:cNvPicPr>
-            <a:picLocks noChangeAspect="1"/>
-          </p:cNvPicPr>
-          <p:nvPr/>
-        </p:nvPicPr>
-        <p:blipFill>
-          <a:blip r:embed="rId3"/>
-          <a:stretch>
-            <a:fillRect/>
-          </a:stretch>
-        </p:blipFill>
-        <p:spPr>
-          <a:xfrm>
-            <a:off x="5964117" y="2472372"/>
-            <a:ext cx="4765615" cy="2678362"/>
-          </a:xfrm>
-          <a:prstGeom prst="rect">
-            <a:avLst/>
-          </a:prstGeom>
-        </p:spPr>
-      </p:pic>
-      <p:sp>
-        <p:nvSpPr>
-          <p:cNvPr id="6" name="Content Placeholder 2">
-            <a:extLst>
-              <a:ext uri="{FF2B5EF4-FFF2-40B4-BE49-F238E27FC236}">
-                <a16:creationId xmlns:a16="http://schemas.microsoft.com/office/drawing/2014/main" id="{52B3831E-B76A-5CB2-63AE-9094BA938FC5}"/>
-              </a:ext>
-            </a:extLst>
-          </p:cNvPr>
-          <p:cNvSpPr>
-            <a:spLocks noGrp="1"/>
-          </p:cNvSpPr>
-          <p:nvPr>
-            <p:ph idx="1"/>
-          </p:nvPr>
-        </p:nvSpPr>
-        <p:spPr>
-          <a:xfrm>
-            <a:off x="1115871" y="5427314"/>
-            <a:ext cx="9613861" cy="3599316"/>
-          </a:xfrm>
-        </p:spPr>
-        <p:txBody>
-          <a:bodyPr>
-            <a:normAutofit/>
-          </a:bodyPr>
-          <a:lstStyle/>
-          <a:p>
-            <a:pPr marL="0" indent="0">
-              <a:buNone/>
-            </a:pPr>
-            <a:r>
-              <a:rPr lang="en-US" sz="1400" dirty="0"/>
-              <a:t>In this project, we have walked through a complete end-to-end machine learning project using the Telecom customer Churn dataset. We started by cleaning the data and analyzing it with visualization. Then, to be able to build a machine learning model, we transformed the categorical data into numeric variables (feature engineering). After transforming the data, we tried 6 different machine learning algorithms (including Deep Learning) using default parameters. Finally, we tuned the hyperparameters of the </a:t>
-            </a:r>
-            <a:r>
-              <a:rPr lang="en-US" sz="1400" dirty="0" err="1"/>
-              <a:t>Adaboost</a:t>
-            </a:r>
-            <a:r>
-              <a:rPr lang="en-US" sz="1400" dirty="0"/>
-              <a:t> (best performance model) for model optimization, obtaining an accuracy of nearly 81%.</a:t>
+              <a:t>Optional statement</a:t>
             </a:r>
           </a:p>
         </p:txBody>
@@ -40121,7 +40149,7 @@
     </p:spTree>
     <p:extLst>
       <p:ext uri="{BB962C8B-B14F-4D97-AF65-F5344CB8AC3E}">
-        <p14:creationId xmlns:p14="http://schemas.microsoft.com/office/powerpoint/2010/main" val="2106282225"/>
+        <p14:creationId xmlns:p14="http://schemas.microsoft.com/office/powerpoint/2010/main" val="3589653851"/>
       </p:ext>
     </p:extLst>
   </p:cSld>
@@ -40162,6 +40190,183 @@
       </p:grpSpPr>
       <p:sp>
         <p:nvSpPr>
+          <p:cNvPr id="2" name="Title 1">
+            <a:extLst>
+              <a:ext uri="{FF2B5EF4-FFF2-40B4-BE49-F238E27FC236}">
+                <a16:creationId xmlns:a16="http://schemas.microsoft.com/office/drawing/2014/main" id="{52DF2A18-C538-D150-4407-6243CF1E0C5A}"/>
+              </a:ext>
+            </a:extLst>
+          </p:cNvPr>
+          <p:cNvSpPr>
+            <a:spLocks noGrp="1"/>
+          </p:cNvSpPr>
+          <p:nvPr>
+            <p:ph type="title"/>
+          </p:nvPr>
+        </p:nvSpPr>
+        <p:spPr/>
+        <p:txBody>
+          <a:bodyPr/>
+          <a:lstStyle/>
+          <a:p>
+            <a:r>
+              <a:rPr lang="en-US" dirty="0"/>
+              <a:t>Conclusion</a:t>
+            </a:r>
+            <a:endParaRPr lang="en-AU" dirty="0"/>
+          </a:p>
+        </p:txBody>
+      </p:sp>
+      <p:pic>
+        <p:nvPicPr>
+          <p:cNvPr id="4" name="Picture 3">
+            <a:extLst>
+              <a:ext uri="{FF2B5EF4-FFF2-40B4-BE49-F238E27FC236}">
+                <a16:creationId xmlns:a16="http://schemas.microsoft.com/office/drawing/2014/main" id="{F02CE017-A968-4309-12CB-E806EA58E2A4}"/>
+              </a:ext>
+            </a:extLst>
+          </p:cNvPr>
+          <p:cNvPicPr>
+            <a:picLocks noChangeAspect="1"/>
+          </p:cNvPicPr>
+          <p:nvPr/>
+        </p:nvPicPr>
+        <p:blipFill>
+          <a:blip r:embed="rId2"/>
+          <a:stretch>
+            <a:fillRect/>
+          </a:stretch>
+        </p:blipFill>
+        <p:spPr>
+          <a:xfrm>
+            <a:off x="792677" y="2440300"/>
+            <a:ext cx="4668580" cy="2710434"/>
+          </a:xfrm>
+          <a:prstGeom prst="rect">
+            <a:avLst/>
+          </a:prstGeom>
+        </p:spPr>
+      </p:pic>
+      <p:pic>
+        <p:nvPicPr>
+          <p:cNvPr id="5" name="Picture 4">
+            <a:extLst>
+              <a:ext uri="{FF2B5EF4-FFF2-40B4-BE49-F238E27FC236}">
+                <a16:creationId xmlns:a16="http://schemas.microsoft.com/office/drawing/2014/main" id="{855D99B0-EE8F-6614-26F2-2BF70F743465}"/>
+              </a:ext>
+            </a:extLst>
+          </p:cNvPr>
+          <p:cNvPicPr>
+            <a:picLocks noChangeAspect="1"/>
+          </p:cNvPicPr>
+          <p:nvPr/>
+        </p:nvPicPr>
+        <p:blipFill>
+          <a:blip r:embed="rId3"/>
+          <a:stretch>
+            <a:fillRect/>
+          </a:stretch>
+        </p:blipFill>
+        <p:spPr>
+          <a:xfrm>
+            <a:off x="5964117" y="2472372"/>
+            <a:ext cx="4765615" cy="2678362"/>
+          </a:xfrm>
+          <a:prstGeom prst="rect">
+            <a:avLst/>
+          </a:prstGeom>
+        </p:spPr>
+      </p:pic>
+      <p:sp>
+        <p:nvSpPr>
+          <p:cNvPr id="6" name="Content Placeholder 2">
+            <a:extLst>
+              <a:ext uri="{FF2B5EF4-FFF2-40B4-BE49-F238E27FC236}">
+                <a16:creationId xmlns:a16="http://schemas.microsoft.com/office/drawing/2014/main" id="{52B3831E-B76A-5CB2-63AE-9094BA938FC5}"/>
+              </a:ext>
+            </a:extLst>
+          </p:cNvPr>
+          <p:cNvSpPr>
+            <a:spLocks noGrp="1"/>
+          </p:cNvSpPr>
+          <p:nvPr>
+            <p:ph idx="1"/>
+          </p:nvPr>
+        </p:nvSpPr>
+        <p:spPr>
+          <a:xfrm>
+            <a:off x="1115871" y="5427314"/>
+            <a:ext cx="9613861" cy="3599316"/>
+          </a:xfrm>
+        </p:spPr>
+        <p:txBody>
+          <a:bodyPr>
+            <a:normAutofit/>
+          </a:bodyPr>
+          <a:lstStyle/>
+          <a:p>
+            <a:pPr marL="0" indent="0">
+              <a:buNone/>
+            </a:pPr>
+            <a:r>
+              <a:rPr lang="en-US" sz="1400" dirty="0"/>
+              <a:t>In this project, we have walked through a complete end-to-end machine learning project using the Telecom customer Churn dataset. We started by cleaning the data and analyzing it with visualization. Then, to be able to build a machine learning model, we transformed the categorical data into numeric variables (feature engineering). After transforming the data, we tried 6 different machine learning algorithms (including Deep Learning) using default parameters. Finally, we tuned the hyperparameters of the </a:t>
+            </a:r>
+            <a:r>
+              <a:rPr lang="en-US" sz="1400" dirty="0" err="1"/>
+              <a:t>Adaboost</a:t>
+            </a:r>
+            <a:r>
+              <a:rPr lang="en-US" sz="1400" dirty="0"/>
+              <a:t> (best performance model) for model optimization, obtaining an accuracy of nearly 81%.</a:t>
+            </a:r>
+          </a:p>
+        </p:txBody>
+      </p:sp>
+    </p:spTree>
+    <p:extLst>
+      <p:ext uri="{BB962C8B-B14F-4D97-AF65-F5344CB8AC3E}">
+        <p14:creationId xmlns:p14="http://schemas.microsoft.com/office/powerpoint/2010/main" val="2106282225"/>
+      </p:ext>
+    </p:extLst>
+  </p:cSld>
+  <p:clrMapOvr>
+    <a:masterClrMapping/>
+  </p:clrMapOvr>
+  <mc:AlternateContent xmlns:mc="http://schemas.openxmlformats.org/markup-compatibility/2006" xmlns:p14="http://schemas.microsoft.com/office/powerpoint/2010/main">
+    <mc:Choice Requires="p14">
+      <p:transition spd="med" p14:dur="700">
+        <p:fade/>
+      </p:transition>
+    </mc:Choice>
+    <mc:Fallback xmlns="">
+      <p:transition spd="med">
+        <p:fade/>
+      </p:transition>
+    </mc:Fallback>
+  </mc:AlternateContent>
+</p:sld>
+</file>
+
+<file path=ppt/slides/slide32.xml><?xml version="1.0" encoding="utf-8"?>
+<p:sld xmlns:a="http://schemas.openxmlformats.org/drawingml/2006/main" xmlns:r="http://schemas.openxmlformats.org/officeDocument/2006/relationships" xmlns:p="http://schemas.openxmlformats.org/presentationml/2006/main">
+  <p:cSld>
+    <p:spTree>
+      <p:nvGrpSpPr>
+        <p:cNvPr id="1" name=""/>
+        <p:cNvGrpSpPr/>
+        <p:nvPr/>
+      </p:nvGrpSpPr>
+      <p:grpSpPr>
+        <a:xfrm>
+          <a:off x="0" y="0"/>
+          <a:ext cx="0" cy="0"/>
+          <a:chOff x="0" y="0"/>
+          <a:chExt cx="0" cy="0"/>
+        </a:xfrm>
+      </p:grpSpPr>
+      <p:sp>
+        <p:nvSpPr>
           <p:cNvPr id="2" name="Title 1"/>
           <p:cNvSpPr>
             <a:spLocks noGrp="1"/>
@@ -40326,7 +40531,7 @@
 </p:sld>
 </file>
 
-<file path=ppt/slides/slide32.xml><?xml version="1.0" encoding="utf-8"?>
+<file path=ppt/slides/slide33.xml><?xml version="1.0" encoding="utf-8"?>
 <p:sld xmlns:a="http://schemas.openxmlformats.org/drawingml/2006/main" xmlns:r="http://schemas.openxmlformats.org/officeDocument/2006/relationships" xmlns:p="http://schemas.openxmlformats.org/presentationml/2006/main">
   <p:cSld>
     <p:bg>
@@ -41075,6 +41280,17 @@
               <a:t>Finding a most suited machine learning model for correct classification of churn and non churn customers</a:t>
             </a:r>
           </a:p>
+          <a:p>
+            <a:r>
+              <a:rPr lang="en-US" dirty="0"/>
+              <a:t>To develop an application to predict whether the customer will churn or not using the </a:t>
+            </a:r>
+            <a:r>
+              <a:rPr lang="en-US"/>
+              <a:t>explanatory variables</a:t>
+            </a:r>
+            <a:endParaRPr lang="en-US" dirty="0"/>
+          </a:p>
         </p:txBody>
       </p:sp>
     </p:spTree>
@@ -41121,13 +41337,7 @@
       </p:grpSpPr>
       <p:sp>
         <p:nvSpPr>
-          <p:cNvPr id="2" name="Title 1">
-            <a:extLst>
-              <a:ext uri="{FF2B5EF4-FFF2-40B4-BE49-F238E27FC236}">
-                <a16:creationId xmlns:a16="http://schemas.microsoft.com/office/drawing/2014/main" id="{EEB44D3C-8A2F-377E-0D19-B0E8CCB8FC35}"/>
-              </a:ext>
-            </a:extLst>
-          </p:cNvPr>
+          <p:cNvPr id="2" name="Title 1"/>
           <p:cNvSpPr>
             <a:spLocks noGrp="1"/>
           </p:cNvSpPr>
@@ -41141,182 +41351,80 @@
           <a:lstStyle/>
           <a:p>
             <a:r>
-              <a:rPr lang="en-US" dirty="0"/>
-              <a:t>Data Pre-processing – Fulfilling the basic assumptions of modeling </a:t>
-            </a:r>
-            <a:endParaRPr lang="en-AU" dirty="0"/>
-          </a:p>
-        </p:txBody>
-      </p:sp>
-      <p:sp>
-        <p:nvSpPr>
-          <p:cNvPr id="4" name="Content Placeholder 3">
-            <a:extLst>
-              <a:ext uri="{FF2B5EF4-FFF2-40B4-BE49-F238E27FC236}">
-                <a16:creationId xmlns:a16="http://schemas.microsoft.com/office/drawing/2014/main" id="{AD7FADF2-8D27-1609-A174-2F6DBE1DB39E}"/>
-              </a:ext>
-            </a:extLst>
-          </p:cNvPr>
-          <p:cNvSpPr>
-            <a:spLocks noGrp="1"/>
-          </p:cNvSpPr>
-          <p:nvPr>
-            <p:ph sz="half" idx="2"/>
-          </p:nvPr>
-        </p:nvSpPr>
-        <p:spPr>
-          <a:xfrm>
-            <a:off x="680322" y="2314938"/>
-            <a:ext cx="9956812" cy="3621250"/>
-          </a:xfrm>
-        </p:spPr>
+              <a:rPr lang="en-US"/>
+              <a:t>Procedure/Methodology</a:t>
+            </a:r>
+            <a:endParaRPr lang="en-US" dirty="0"/>
+          </a:p>
+        </p:txBody>
+      </p:sp>
+      <p:sp>
+        <p:nvSpPr>
+          <p:cNvPr id="3" name="Content Placeholder 2"/>
+          <p:cNvSpPr>
+            <a:spLocks noGrp="1"/>
+          </p:cNvSpPr>
+          <p:nvPr>
+            <p:ph idx="1"/>
+          </p:nvPr>
+        </p:nvSpPr>
+        <p:spPr/>
         <p:txBody>
           <a:bodyPr>
-            <a:normAutofit fontScale="92500" lnSpcReduction="10000"/>
+            <a:normAutofit fontScale="77500" lnSpcReduction="20000"/>
           </a:bodyPr>
           <a:lstStyle/>
           <a:p>
-            <a:pPr>
-              <a:lnSpc>
-                <a:spcPct val="107000"/>
-              </a:lnSpc>
-              <a:spcAft>
-                <a:spcPts val="800"/>
-              </a:spcAft>
+            <a:pPr marL="0" indent="0">
+              <a:buNone/>
             </a:pPr>
             <a:r>
-              <a:rPr lang="en-AU" b="1" dirty="0">
-                <a:effectLst/>
-                <a:latin typeface="Calibri" panose="020F0502020204030204" pitchFamily="34" charset="0"/>
-                <a:ea typeface="Calibri" panose="020F0502020204030204" pitchFamily="34" charset="0"/>
-                <a:cs typeface="Times New Roman" panose="02020603050405020304" pitchFamily="18" charset="0"/>
-              </a:rPr>
-              <a:t>Prediction Outcome Nature - Binary outcome Predicting whether the customer will churn or not.</a:t>
-            </a:r>
-          </a:p>
-          <a:p>
-            <a:pPr>
-              <a:lnSpc>
-                <a:spcPct val="107000"/>
-              </a:lnSpc>
-              <a:spcAft>
-                <a:spcPts val="800"/>
-              </a:spcAft>
-            </a:pPr>
-            <a:r>
-              <a:rPr lang="en-AU" b="1" dirty="0">
-                <a:effectLst/>
-                <a:latin typeface="Calibri" panose="020F0502020204030204" pitchFamily="34" charset="0"/>
-                <a:ea typeface="Calibri" panose="020F0502020204030204" pitchFamily="34" charset="0"/>
-                <a:cs typeface="Times New Roman" panose="02020603050405020304" pitchFamily="18" charset="0"/>
-              </a:rPr>
-              <a:t>Supervised Learning is applied as we have a labelled data set.</a:t>
-            </a:r>
-          </a:p>
-          <a:p>
-            <a:pPr>
-              <a:lnSpc>
-                <a:spcPct val="107000"/>
-              </a:lnSpc>
-              <a:spcAft>
-                <a:spcPts val="800"/>
-              </a:spcAft>
-            </a:pPr>
-            <a:r>
-              <a:rPr lang="en-AU" b="1" dirty="0">
-                <a:effectLst/>
-                <a:latin typeface="Calibri" panose="020F0502020204030204" pitchFamily="34" charset="0"/>
-                <a:ea typeface="Calibri" panose="020F0502020204030204" pitchFamily="34" charset="0"/>
-                <a:cs typeface="Times New Roman" panose="02020603050405020304" pitchFamily="18" charset="0"/>
-              </a:rPr>
-              <a:t> The Requirements for machine learning models selected based on the prediction outcome</a:t>
-            </a:r>
-          </a:p>
-          <a:p>
-            <a:pPr lvl="1">
-              <a:lnSpc>
-                <a:spcPct val="107000"/>
-              </a:lnSpc>
-              <a:spcAft>
-                <a:spcPts val="800"/>
-              </a:spcAft>
-            </a:pPr>
-            <a:r>
-              <a:rPr lang="en-AU" b="1" dirty="0">
-                <a:effectLst/>
-                <a:latin typeface="Calibri" panose="020F0502020204030204" pitchFamily="34" charset="0"/>
-                <a:ea typeface="Calibri" panose="020F0502020204030204" pitchFamily="34" charset="0"/>
-                <a:cs typeface="Times New Roman" panose="02020603050405020304" pitchFamily="18" charset="0"/>
-              </a:rPr>
-              <a:t>The Response Variable is Binary</a:t>
-            </a:r>
-          </a:p>
-          <a:p>
-            <a:pPr lvl="1">
-              <a:lnSpc>
-                <a:spcPct val="107000"/>
-              </a:lnSpc>
-              <a:spcAft>
-                <a:spcPts val="800"/>
-              </a:spcAft>
-            </a:pPr>
-            <a:r>
-              <a:rPr lang="en-AU" b="1" dirty="0">
-                <a:effectLst/>
-                <a:latin typeface="Calibri" panose="020F0502020204030204" pitchFamily="34" charset="0"/>
-                <a:ea typeface="Calibri" panose="020F0502020204030204" pitchFamily="34" charset="0"/>
-                <a:cs typeface="Times New Roman" panose="02020603050405020304" pitchFamily="18" charset="0"/>
-              </a:rPr>
-              <a:t>There is No Multicollinearity Among Explanatory Variables</a:t>
-            </a:r>
-          </a:p>
-          <a:p>
-            <a:pPr lvl="1">
-              <a:lnSpc>
-                <a:spcPct val="107000"/>
-              </a:lnSpc>
-              <a:spcAft>
-                <a:spcPts val="800"/>
-              </a:spcAft>
-            </a:pPr>
-            <a:r>
-              <a:rPr lang="en-AU" b="1" dirty="0">
-                <a:effectLst/>
-                <a:latin typeface="Calibri" panose="020F0502020204030204" pitchFamily="34" charset="0"/>
-                <a:ea typeface="Calibri" panose="020F0502020204030204" pitchFamily="34" charset="0"/>
-                <a:cs typeface="Times New Roman" panose="02020603050405020304" pitchFamily="18" charset="0"/>
-              </a:rPr>
-              <a:t>The Sample Size is Sufficiently Large (more than 500 data points)</a:t>
-            </a:r>
-          </a:p>
-          <a:p>
-            <a:pPr lvl="1">
-              <a:lnSpc>
-                <a:spcPct val="107000"/>
-              </a:lnSpc>
-              <a:spcAft>
-                <a:spcPts val="800"/>
-              </a:spcAft>
-            </a:pPr>
-            <a:r>
-              <a:rPr lang="en-AU" b="1" dirty="0">
-                <a:effectLst/>
-                <a:latin typeface="Calibri" panose="020F0502020204030204" pitchFamily="34" charset="0"/>
-                <a:ea typeface="Calibri" panose="020F0502020204030204" pitchFamily="34" charset="0"/>
-                <a:cs typeface="Times New Roman" panose="02020603050405020304" pitchFamily="18" charset="0"/>
-              </a:rPr>
-              <a:t>There are No Extreme Outliers </a:t>
-            </a:r>
-          </a:p>
-          <a:p>
-            <a:endParaRPr lang="en-AU" sz="2400" b="1" dirty="0"/>
+              <a:rPr lang="en-US" dirty="0"/>
+              <a:t>We have taken the following suggestive steps to build the model</a:t>
+            </a:r>
+          </a:p>
+          <a:p>
+            <a:r>
+              <a:rPr lang="en-US" dirty="0"/>
+              <a:t>Preprocess data (convert columns to appropriate formats, handle missing values, etc.)</a:t>
+            </a:r>
+          </a:p>
+          <a:p>
+            <a:r>
+              <a:rPr lang="en-US" dirty="0"/>
+              <a:t>Conduct appropriate exploratory analysis to extract useful insights (whether directly useful for business or for eventual modelling/feature engineering)</a:t>
+            </a:r>
+          </a:p>
+          <a:p>
+            <a:r>
+              <a:rPr lang="en-US" dirty="0"/>
+              <a:t>Derive new features</a:t>
+            </a:r>
+          </a:p>
+          <a:p>
+            <a:r>
+              <a:rPr lang="en-US" dirty="0"/>
+              <a:t>Train a variety of models, tune model hyperparameters, etc. (handle class imbalance using appropriate techniques such as Accuracy, Recall, Precision, F1score, F2Score)</a:t>
+            </a:r>
+          </a:p>
+          <a:p>
+            <a:r>
+              <a:rPr lang="en-US" dirty="0"/>
+              <a:t>Evaluate the models using appropriate evaluation metrics. Note that it is more important to identify churners than the non-churners accurately - choose an appropriate evaluation metric which reflects this business goal</a:t>
+            </a:r>
+          </a:p>
+          <a:p>
+            <a:r>
+              <a:rPr lang="en-US" dirty="0"/>
+              <a:t>Finally, choose a model based on some evaluation metric</a:t>
+            </a:r>
           </a:p>
         </p:txBody>
       </p:sp>
     </p:spTree>
     <p:extLst>
       <p:ext uri="{BB962C8B-B14F-4D97-AF65-F5344CB8AC3E}">
-        <p14:creationId xmlns:p14="http://schemas.microsoft.com/office/powerpoint/2010/main" val="3194072311"/>
+        <p14:creationId xmlns:p14="http://schemas.microsoft.com/office/powerpoint/2010/main" val="1575721539"/>
       </p:ext>
     </p:extLst>
   </p:cSld>
@@ -41378,7 +41486,7 @@
           <a:p>
             <a:r>
               <a:rPr lang="en-US" dirty="0"/>
-              <a:t>Steps of Processing</a:t>
+              <a:t>Data Pre-processing – Fulfilling the basic assumptions of modeling </a:t>
             </a:r>
             <a:endParaRPr lang="en-AU" dirty="0"/>
           </a:p>
@@ -41402,205 +41510,147 @@
         </p:nvSpPr>
         <p:spPr>
           <a:xfrm>
-            <a:off x="0" y="2314937"/>
-            <a:ext cx="12192000" cy="4543063"/>
+            <a:off x="680322" y="2314938"/>
+            <a:ext cx="9956812" cy="3621250"/>
           </a:xfrm>
         </p:spPr>
         <p:txBody>
           <a:bodyPr>
-            <a:normAutofit/>
+            <a:normAutofit fontScale="92500" lnSpcReduction="10000"/>
           </a:bodyPr>
           <a:lstStyle/>
           <a:p>
-            <a:pPr marL="342900" indent="-342900">
+            <a:pPr>
               <a:lnSpc>
                 <a:spcPct val="107000"/>
               </a:lnSpc>
               <a:spcAft>
                 <a:spcPts val="800"/>
               </a:spcAft>
-              <a:buFont typeface="+mj-lt"/>
-              <a:buAutoNum type="arabicPeriod"/>
             </a:pPr>
             <a:r>
-              <a:rPr lang="en-AU" sz="1800" dirty="0">
+              <a:rPr lang="en-AU" b="1" dirty="0">
                 <a:effectLst/>
                 <a:latin typeface="Calibri" panose="020F0502020204030204" pitchFamily="34" charset="0"/>
                 <a:ea typeface="Calibri" panose="020F0502020204030204" pitchFamily="34" charset="0"/>
                 <a:cs typeface="Times New Roman" panose="02020603050405020304" pitchFamily="18" charset="0"/>
               </a:rPr>
-              <a:t>Data Imputation </a:t>
-            </a:r>
-          </a:p>
-          <a:p>
-            <a:pPr marL="342900" indent="-342900">
+              <a:t>Prediction Outcome Nature - Binary outcome Predicting whether the customer will churn or not.</a:t>
+            </a:r>
+          </a:p>
+          <a:p>
+            <a:pPr>
               <a:lnSpc>
                 <a:spcPct val="107000"/>
               </a:lnSpc>
               <a:spcAft>
                 <a:spcPts val="800"/>
               </a:spcAft>
-              <a:buFont typeface="+mj-lt"/>
-              <a:buAutoNum type="arabicPeriod"/>
             </a:pPr>
             <a:r>
-              <a:rPr lang="en-AU" sz="1800" dirty="0">
+              <a:rPr lang="en-AU" b="1" dirty="0">
                 <a:effectLst/>
                 <a:latin typeface="Calibri" panose="020F0502020204030204" pitchFamily="34" charset="0"/>
                 <a:ea typeface="Calibri" panose="020F0502020204030204" pitchFamily="34" charset="0"/>
                 <a:cs typeface="Times New Roman" panose="02020603050405020304" pitchFamily="18" charset="0"/>
               </a:rPr>
-              <a:t>Feature selection is one of the first and important steps while performing any machine learning  using heatmaps and box plots. A feature in case of a dataset simply means a column</a:t>
-            </a:r>
-          </a:p>
-          <a:p>
-            <a:pPr marL="342900" indent="-342900">
+              <a:t>Supervised Learning is applied as we have a labelled data set.</a:t>
+            </a:r>
+          </a:p>
+          <a:p>
+            <a:pPr>
               <a:lnSpc>
                 <a:spcPct val="107000"/>
               </a:lnSpc>
               <a:spcAft>
                 <a:spcPts val="800"/>
               </a:spcAft>
-              <a:buFont typeface="+mj-lt"/>
-              <a:buAutoNum type="arabicPeriod"/>
             </a:pPr>
             <a:r>
-              <a:rPr lang="en-AU" sz="1800" dirty="0">
+              <a:rPr lang="en-AU" b="1" dirty="0">
                 <a:effectLst/>
                 <a:latin typeface="Calibri" panose="020F0502020204030204" pitchFamily="34" charset="0"/>
                 <a:ea typeface="Calibri" panose="020F0502020204030204" pitchFamily="34" charset="0"/>
                 <a:cs typeface="Times New Roman" panose="02020603050405020304" pitchFamily="18" charset="0"/>
               </a:rPr>
-              <a:t>Pre-process ordinal and nominal categorical variables differently. [label encoder for ordinal and hot encoding for nominal]</a:t>
-            </a:r>
-          </a:p>
-          <a:p>
-            <a:pPr marL="342900" indent="-342900">
+              <a:t> The Requirements for machine learning models selected based on the prediction outcome</a:t>
+            </a:r>
+          </a:p>
+          <a:p>
+            <a:pPr lvl="1">
               <a:lnSpc>
                 <a:spcPct val="107000"/>
               </a:lnSpc>
               <a:spcAft>
                 <a:spcPts val="800"/>
               </a:spcAft>
-              <a:buFont typeface="+mj-lt"/>
-              <a:buAutoNum type="arabicPeriod"/>
             </a:pPr>
             <a:r>
-              <a:rPr lang="en-AU" sz="1800" dirty="0">
+              <a:rPr lang="en-AU" b="1" dirty="0">
                 <a:effectLst/>
                 <a:latin typeface="Calibri" panose="020F0502020204030204" pitchFamily="34" charset="0"/>
                 <a:ea typeface="Calibri" panose="020F0502020204030204" pitchFamily="34" charset="0"/>
                 <a:cs typeface="Times New Roman" panose="02020603050405020304" pitchFamily="18" charset="0"/>
               </a:rPr>
-              <a:t>Standardization-In Standardization, we transform our values such that the mean of the values is 0 and the standard deviation is 1</a:t>
-            </a:r>
-          </a:p>
-          <a:p>
-            <a:pPr marL="342900" indent="-342900">
+              <a:t>The Response Variable is Binary</a:t>
+            </a:r>
+          </a:p>
+          <a:p>
+            <a:pPr lvl="1">
               <a:lnSpc>
                 <a:spcPct val="107000"/>
               </a:lnSpc>
               <a:spcAft>
                 <a:spcPts val="800"/>
               </a:spcAft>
-              <a:buFont typeface="+mj-lt"/>
-              <a:buAutoNum type="arabicPeriod"/>
             </a:pPr>
             <a:r>
-              <a:rPr lang="en-AU" sz="1800" dirty="0">
+              <a:rPr lang="en-AU" b="1" dirty="0">
                 <a:effectLst/>
                 <a:latin typeface="Calibri" panose="020F0502020204030204" pitchFamily="34" charset="0"/>
                 <a:ea typeface="Calibri" panose="020F0502020204030204" pitchFamily="34" charset="0"/>
                 <a:cs typeface="Times New Roman" panose="02020603050405020304" pitchFamily="18" charset="0"/>
               </a:rPr>
-              <a:t>Check for Multicollinearity. – we have used VIF </a:t>
-            </a:r>
-          </a:p>
-          <a:p>
-            <a:pPr marL="342900" indent="-342900">
+              <a:t>There is No Multicollinearity Among Explanatory Variables</a:t>
+            </a:r>
+          </a:p>
+          <a:p>
+            <a:pPr lvl="1">
               <a:lnSpc>
                 <a:spcPct val="107000"/>
               </a:lnSpc>
               <a:spcAft>
                 <a:spcPts val="800"/>
               </a:spcAft>
-              <a:buFont typeface="+mj-lt"/>
-              <a:buAutoNum type="arabicPeriod"/>
             </a:pPr>
-            <a:endParaRPr lang="en-AU" sz="1800" dirty="0">
-              <a:effectLst/>
-              <a:latin typeface="Calibri" panose="020F0502020204030204" pitchFamily="34" charset="0"/>
-              <a:ea typeface="Calibri" panose="020F0502020204030204" pitchFamily="34" charset="0"/>
-              <a:cs typeface="Times New Roman" panose="02020603050405020304" pitchFamily="18" charset="0"/>
-            </a:endParaRPr>
-          </a:p>
-          <a:p>
-            <a:pPr marL="0" indent="0">
+            <a:r>
+              <a:rPr lang="en-AU" b="1" dirty="0">
+                <a:effectLst/>
+                <a:latin typeface="Calibri" panose="020F0502020204030204" pitchFamily="34" charset="0"/>
+                <a:ea typeface="Calibri" panose="020F0502020204030204" pitchFamily="34" charset="0"/>
+                <a:cs typeface="Times New Roman" panose="02020603050405020304" pitchFamily="18" charset="0"/>
+              </a:rPr>
+              <a:t>The Sample Size is Sufficiently Large (more than 500 data points)</a:t>
+            </a:r>
+          </a:p>
+          <a:p>
+            <a:pPr lvl="1">
               <a:lnSpc>
                 <a:spcPct val="107000"/>
               </a:lnSpc>
               <a:spcAft>
                 <a:spcPts val="800"/>
               </a:spcAft>
-              <a:buNone/>
             </a:pPr>
-            <a:endParaRPr lang="en-AU" sz="1800" dirty="0">
-              <a:effectLst/>
-              <a:latin typeface="Calibri" panose="020F0502020204030204" pitchFamily="34" charset="0"/>
-              <a:ea typeface="Calibri" panose="020F0502020204030204" pitchFamily="34" charset="0"/>
-              <a:cs typeface="Times New Roman" panose="02020603050405020304" pitchFamily="18" charset="0"/>
-            </a:endParaRPr>
-          </a:p>
-          <a:p>
-            <a:pPr marL="0" indent="0">
-              <a:lnSpc>
-                <a:spcPct val="107000"/>
-              </a:lnSpc>
-              <a:spcAft>
-                <a:spcPts val="800"/>
-              </a:spcAft>
-              <a:buNone/>
-            </a:pPr>
-            <a:endParaRPr lang="en-AU" sz="1800" dirty="0">
-              <a:effectLst/>
-              <a:latin typeface="Calibri" panose="020F0502020204030204" pitchFamily="34" charset="0"/>
-              <a:ea typeface="Calibri" panose="020F0502020204030204" pitchFamily="34" charset="0"/>
-              <a:cs typeface="Times New Roman" panose="02020603050405020304" pitchFamily="18" charset="0"/>
-            </a:endParaRPr>
-          </a:p>
-          <a:p>
-            <a:pPr marL="0" indent="0">
-              <a:lnSpc>
-                <a:spcPct val="107000"/>
-              </a:lnSpc>
-              <a:spcAft>
-                <a:spcPts val="800"/>
-              </a:spcAft>
-              <a:buNone/>
-            </a:pPr>
-            <a:endParaRPr lang="en-AU" sz="1800" dirty="0">
-              <a:effectLst/>
-              <a:latin typeface="Calibri" panose="020F0502020204030204" pitchFamily="34" charset="0"/>
-              <a:ea typeface="Calibri" panose="020F0502020204030204" pitchFamily="34" charset="0"/>
-              <a:cs typeface="Times New Roman" panose="02020603050405020304" pitchFamily="18" charset="0"/>
-            </a:endParaRPr>
-          </a:p>
-          <a:p>
-            <a:pPr marL="0" indent="0">
-              <a:lnSpc>
-                <a:spcPct val="107000"/>
-              </a:lnSpc>
-              <a:spcAft>
-                <a:spcPts val="800"/>
-              </a:spcAft>
-              <a:buNone/>
-            </a:pPr>
-            <a:endParaRPr lang="en-AU" sz="1800" dirty="0">
-              <a:effectLst/>
-              <a:latin typeface="Calibri" panose="020F0502020204030204" pitchFamily="34" charset="0"/>
-              <a:ea typeface="Calibri" panose="020F0502020204030204" pitchFamily="34" charset="0"/>
-              <a:cs typeface="Times New Roman" panose="02020603050405020304" pitchFamily="18" charset="0"/>
-            </a:endParaRPr>
+            <a:r>
+              <a:rPr lang="en-AU" b="1" dirty="0">
+                <a:effectLst/>
+                <a:latin typeface="Calibri" panose="020F0502020204030204" pitchFamily="34" charset="0"/>
+                <a:ea typeface="Calibri" panose="020F0502020204030204" pitchFamily="34" charset="0"/>
+                <a:cs typeface="Times New Roman" panose="02020603050405020304" pitchFamily="18" charset="0"/>
+              </a:rPr>
+              <a:t>There are No Extreme Outliers </a:t>
+            </a:r>
           </a:p>
           <a:p>
             <a:endParaRPr lang="en-AU" sz="2400" b="1" dirty="0"/>
@@ -41610,7 +41660,7 @@
     </p:spTree>
     <p:extLst>
       <p:ext uri="{BB962C8B-B14F-4D97-AF65-F5344CB8AC3E}">
-        <p14:creationId xmlns:p14="http://schemas.microsoft.com/office/powerpoint/2010/main" val="522296525"/>
+        <p14:creationId xmlns:p14="http://schemas.microsoft.com/office/powerpoint/2010/main" val="3194072311"/>
       </p:ext>
     </p:extLst>
   </p:cSld>
@@ -41678,116 +41728,233 @@
           </a:p>
         </p:txBody>
       </p:sp>
-      <p:pic>
-        <p:nvPicPr>
-          <p:cNvPr id="6" name="Picture 5">
+      <p:sp>
+        <p:nvSpPr>
+          <p:cNvPr id="4" name="Content Placeholder 3">
             <a:extLst>
               <a:ext uri="{FF2B5EF4-FFF2-40B4-BE49-F238E27FC236}">
-                <a16:creationId xmlns:a16="http://schemas.microsoft.com/office/drawing/2014/main" id="{452F0C96-3B59-AF1D-906A-541B776BB42F}"/>
+                <a16:creationId xmlns:a16="http://schemas.microsoft.com/office/drawing/2014/main" id="{AD7FADF2-8D27-1609-A174-2F6DBE1DB39E}"/>
               </a:ext>
             </a:extLst>
           </p:cNvPr>
-          <p:cNvPicPr>
-            <a:picLocks noChangeAspect="1"/>
-          </p:cNvPicPr>
-          <p:nvPr/>
-        </p:nvPicPr>
-        <p:blipFill>
-          <a:blip r:embed="rId2">
-            <a:extLst>
-              <a:ext uri="{28A0092B-C50C-407E-A947-70E740481C1C}">
-                <a14:useLocalDpi xmlns:a14="http://schemas.microsoft.com/office/drawing/2010/main" val="0"/>
-              </a:ext>
-            </a:extLst>
-          </a:blip>
-          <a:srcRect/>
-          <a:stretch>
-            <a:fillRect/>
-          </a:stretch>
-        </p:blipFill>
-        <p:spPr bwMode="auto">
-          <a:xfrm>
-            <a:off x="0" y="2502423"/>
-            <a:ext cx="4867275" cy="3867150"/>
-          </a:xfrm>
-          <a:prstGeom prst="rect">
-            <a:avLst/>
-          </a:prstGeom>
-          <a:noFill/>
-        </p:spPr>
-      </p:pic>
-      <p:pic>
-        <p:nvPicPr>
-          <p:cNvPr id="7" name="Picture 6">
-            <a:extLst>
-              <a:ext uri="{FF2B5EF4-FFF2-40B4-BE49-F238E27FC236}">
-                <a16:creationId xmlns:a16="http://schemas.microsoft.com/office/drawing/2014/main" id="{D86A47C2-DD16-B828-A998-2EB75F21030A}"/>
-              </a:ext>
-            </a:extLst>
-          </p:cNvPr>
-          <p:cNvPicPr>
-            <a:picLocks noChangeAspect="1"/>
-          </p:cNvPicPr>
-          <p:nvPr/>
-        </p:nvPicPr>
-        <p:blipFill>
-          <a:blip r:embed="rId3">
-            <a:extLst>
-              <a:ext uri="{28A0092B-C50C-407E-A947-70E740481C1C}">
-                <a14:useLocalDpi xmlns:a14="http://schemas.microsoft.com/office/drawing/2010/main" val="0"/>
-              </a:ext>
-            </a:extLst>
-          </a:blip>
-          <a:srcRect/>
-          <a:stretch>
-            <a:fillRect/>
-          </a:stretch>
-        </p:blipFill>
-        <p:spPr bwMode="auto">
-          <a:xfrm>
-            <a:off x="5630939" y="2502423"/>
-            <a:ext cx="6236970" cy="1600200"/>
-          </a:xfrm>
-          <a:prstGeom prst="rect">
-            <a:avLst/>
-          </a:prstGeom>
-          <a:noFill/>
-        </p:spPr>
-      </p:pic>
-      <p:pic>
-        <p:nvPicPr>
-          <p:cNvPr id="8" name="Picture 7">
-            <a:extLst>
-              <a:ext uri="{FF2B5EF4-FFF2-40B4-BE49-F238E27FC236}">
-                <a16:creationId xmlns:a16="http://schemas.microsoft.com/office/drawing/2014/main" id="{A795CD48-3475-2D47-CD00-B843BF205D21}"/>
-              </a:ext>
-            </a:extLst>
-          </p:cNvPr>
-          <p:cNvPicPr>
-            <a:picLocks noChangeAspect="1"/>
-          </p:cNvPicPr>
-          <p:nvPr/>
-        </p:nvPicPr>
-        <p:blipFill>
-          <a:blip r:embed="rId4"/>
-          <a:stretch>
-            <a:fillRect/>
-          </a:stretch>
-        </p:blipFill>
-        <p:spPr>
-          <a:xfrm>
-            <a:off x="6458770" y="4349091"/>
-            <a:ext cx="3672840" cy="2118360"/>
-          </a:xfrm>
-          <a:prstGeom prst="rect">
-            <a:avLst/>
-          </a:prstGeom>
-        </p:spPr>
-      </p:pic>
+          <p:cNvSpPr>
+            <a:spLocks noGrp="1"/>
+          </p:cNvSpPr>
+          <p:nvPr>
+            <p:ph sz="half" idx="2"/>
+          </p:nvPr>
+        </p:nvSpPr>
+        <p:spPr>
+          <a:xfrm>
+            <a:off x="0" y="2314937"/>
+            <a:ext cx="12192000" cy="4543063"/>
+          </a:xfrm>
+        </p:spPr>
+        <p:txBody>
+          <a:bodyPr>
+            <a:normAutofit/>
+          </a:bodyPr>
+          <a:lstStyle/>
+          <a:p>
+            <a:pPr marL="342900" indent="-342900">
+              <a:lnSpc>
+                <a:spcPct val="107000"/>
+              </a:lnSpc>
+              <a:spcAft>
+                <a:spcPts val="800"/>
+              </a:spcAft>
+              <a:buFont typeface="+mj-lt"/>
+              <a:buAutoNum type="arabicPeriod"/>
+            </a:pPr>
+            <a:r>
+              <a:rPr lang="en-AU" sz="1800" dirty="0">
+                <a:effectLst/>
+                <a:latin typeface="Calibri" panose="020F0502020204030204" pitchFamily="34" charset="0"/>
+                <a:ea typeface="Calibri" panose="020F0502020204030204" pitchFamily="34" charset="0"/>
+                <a:cs typeface="Times New Roman" panose="02020603050405020304" pitchFamily="18" charset="0"/>
+              </a:rPr>
+              <a:t>Data Imputation </a:t>
+            </a:r>
+          </a:p>
+          <a:p>
+            <a:pPr marL="342900" indent="-342900">
+              <a:lnSpc>
+                <a:spcPct val="107000"/>
+              </a:lnSpc>
+              <a:spcAft>
+                <a:spcPts val="800"/>
+              </a:spcAft>
+              <a:buFont typeface="+mj-lt"/>
+              <a:buAutoNum type="arabicPeriod"/>
+            </a:pPr>
+            <a:r>
+              <a:rPr lang="en-AU" sz="1800" dirty="0">
+                <a:effectLst/>
+                <a:latin typeface="Calibri" panose="020F0502020204030204" pitchFamily="34" charset="0"/>
+                <a:ea typeface="Calibri" panose="020F0502020204030204" pitchFamily="34" charset="0"/>
+                <a:cs typeface="Times New Roman" panose="02020603050405020304" pitchFamily="18" charset="0"/>
+              </a:rPr>
+              <a:t>Feature selection is one of the first and important steps while performing any machine learning  using heatmaps and box plots. A feature in case of a dataset simply means a column</a:t>
+            </a:r>
+          </a:p>
+          <a:p>
+            <a:pPr marL="342900" indent="-342900">
+              <a:lnSpc>
+                <a:spcPct val="107000"/>
+              </a:lnSpc>
+              <a:spcAft>
+                <a:spcPts val="800"/>
+              </a:spcAft>
+              <a:buFont typeface="+mj-lt"/>
+              <a:buAutoNum type="arabicPeriod"/>
+            </a:pPr>
+            <a:r>
+              <a:rPr lang="en-AU" sz="1800" dirty="0">
+                <a:effectLst/>
+                <a:latin typeface="Calibri" panose="020F0502020204030204" pitchFamily="34" charset="0"/>
+                <a:ea typeface="Calibri" panose="020F0502020204030204" pitchFamily="34" charset="0"/>
+                <a:cs typeface="Times New Roman" panose="02020603050405020304" pitchFamily="18" charset="0"/>
+              </a:rPr>
+              <a:t>Pre-process ordinal and nominal categorical variables differently. [label encoder for ordinal and hot encoding for nominal]</a:t>
+            </a:r>
+          </a:p>
+          <a:p>
+            <a:pPr marL="342900" indent="-342900">
+              <a:lnSpc>
+                <a:spcPct val="107000"/>
+              </a:lnSpc>
+              <a:spcAft>
+                <a:spcPts val="800"/>
+              </a:spcAft>
+              <a:buFont typeface="+mj-lt"/>
+              <a:buAutoNum type="arabicPeriod"/>
+            </a:pPr>
+            <a:r>
+              <a:rPr lang="en-AU" sz="1800" dirty="0">
+                <a:effectLst/>
+                <a:latin typeface="Calibri" panose="020F0502020204030204" pitchFamily="34" charset="0"/>
+                <a:ea typeface="Calibri" panose="020F0502020204030204" pitchFamily="34" charset="0"/>
+                <a:cs typeface="Times New Roman" panose="02020603050405020304" pitchFamily="18" charset="0"/>
+              </a:rPr>
+              <a:t>Standardization-In Standardization, we transform our values such that the mean of the values is 0 and the standard deviation is 1</a:t>
+            </a:r>
+          </a:p>
+          <a:p>
+            <a:pPr marL="342900" indent="-342900">
+              <a:lnSpc>
+                <a:spcPct val="107000"/>
+              </a:lnSpc>
+              <a:spcAft>
+                <a:spcPts val="800"/>
+              </a:spcAft>
+              <a:buFont typeface="+mj-lt"/>
+              <a:buAutoNum type="arabicPeriod"/>
+            </a:pPr>
+            <a:r>
+              <a:rPr lang="en-AU" sz="1800" dirty="0">
+                <a:effectLst/>
+                <a:latin typeface="Calibri" panose="020F0502020204030204" pitchFamily="34" charset="0"/>
+                <a:ea typeface="Calibri" panose="020F0502020204030204" pitchFamily="34" charset="0"/>
+                <a:cs typeface="Times New Roman" panose="02020603050405020304" pitchFamily="18" charset="0"/>
+              </a:rPr>
+              <a:t>Check for Multicollinearity. – we have used VIF </a:t>
+            </a:r>
+          </a:p>
+          <a:p>
+            <a:pPr marL="342900" indent="-342900">
+              <a:lnSpc>
+                <a:spcPct val="107000"/>
+              </a:lnSpc>
+              <a:spcAft>
+                <a:spcPts val="800"/>
+              </a:spcAft>
+              <a:buFont typeface="+mj-lt"/>
+              <a:buAutoNum type="arabicPeriod"/>
+            </a:pPr>
+            <a:endParaRPr lang="en-AU" sz="1800" dirty="0">
+              <a:effectLst/>
+              <a:latin typeface="Calibri" panose="020F0502020204030204" pitchFamily="34" charset="0"/>
+              <a:ea typeface="Calibri" panose="020F0502020204030204" pitchFamily="34" charset="0"/>
+              <a:cs typeface="Times New Roman" panose="02020603050405020304" pitchFamily="18" charset="0"/>
+            </a:endParaRPr>
+          </a:p>
+          <a:p>
+            <a:pPr marL="0" indent="0">
+              <a:lnSpc>
+                <a:spcPct val="107000"/>
+              </a:lnSpc>
+              <a:spcAft>
+                <a:spcPts val="800"/>
+              </a:spcAft>
+              <a:buNone/>
+            </a:pPr>
+            <a:endParaRPr lang="en-AU" sz="1800" dirty="0">
+              <a:effectLst/>
+              <a:latin typeface="Calibri" panose="020F0502020204030204" pitchFamily="34" charset="0"/>
+              <a:ea typeface="Calibri" panose="020F0502020204030204" pitchFamily="34" charset="0"/>
+              <a:cs typeface="Times New Roman" panose="02020603050405020304" pitchFamily="18" charset="0"/>
+            </a:endParaRPr>
+          </a:p>
+          <a:p>
+            <a:pPr marL="0" indent="0">
+              <a:lnSpc>
+                <a:spcPct val="107000"/>
+              </a:lnSpc>
+              <a:spcAft>
+                <a:spcPts val="800"/>
+              </a:spcAft>
+              <a:buNone/>
+            </a:pPr>
+            <a:endParaRPr lang="en-AU" sz="1800" dirty="0">
+              <a:effectLst/>
+              <a:latin typeface="Calibri" panose="020F0502020204030204" pitchFamily="34" charset="0"/>
+              <a:ea typeface="Calibri" panose="020F0502020204030204" pitchFamily="34" charset="0"/>
+              <a:cs typeface="Times New Roman" panose="02020603050405020304" pitchFamily="18" charset="0"/>
+            </a:endParaRPr>
+          </a:p>
+          <a:p>
+            <a:pPr marL="0" indent="0">
+              <a:lnSpc>
+                <a:spcPct val="107000"/>
+              </a:lnSpc>
+              <a:spcAft>
+                <a:spcPts val="800"/>
+              </a:spcAft>
+              <a:buNone/>
+            </a:pPr>
+            <a:endParaRPr lang="en-AU" sz="1800" dirty="0">
+              <a:effectLst/>
+              <a:latin typeface="Calibri" panose="020F0502020204030204" pitchFamily="34" charset="0"/>
+              <a:ea typeface="Calibri" panose="020F0502020204030204" pitchFamily="34" charset="0"/>
+              <a:cs typeface="Times New Roman" panose="02020603050405020304" pitchFamily="18" charset="0"/>
+            </a:endParaRPr>
+          </a:p>
+          <a:p>
+            <a:pPr marL="0" indent="0">
+              <a:lnSpc>
+                <a:spcPct val="107000"/>
+              </a:lnSpc>
+              <a:spcAft>
+                <a:spcPts val="800"/>
+              </a:spcAft>
+              <a:buNone/>
+            </a:pPr>
+            <a:endParaRPr lang="en-AU" sz="1800" dirty="0">
+              <a:effectLst/>
+              <a:latin typeface="Calibri" panose="020F0502020204030204" pitchFamily="34" charset="0"/>
+              <a:ea typeface="Calibri" panose="020F0502020204030204" pitchFamily="34" charset="0"/>
+              <a:cs typeface="Times New Roman" panose="02020603050405020304" pitchFamily="18" charset="0"/>
+            </a:endParaRPr>
+          </a:p>
+          <a:p>
+            <a:endParaRPr lang="en-AU" sz="2400" b="1" dirty="0"/>
+          </a:p>
+        </p:txBody>
+      </p:sp>
     </p:spTree>
     <p:extLst>
       <p:ext uri="{BB962C8B-B14F-4D97-AF65-F5344CB8AC3E}">
-        <p14:creationId xmlns:p14="http://schemas.microsoft.com/office/powerpoint/2010/main" val="280790843"/>
+        <p14:creationId xmlns:p14="http://schemas.microsoft.com/office/powerpoint/2010/main" val="522296525"/>
       </p:ext>
     </p:extLst>
   </p:cSld>
@@ -41828,7 +41995,13 @@
       </p:grpSpPr>
       <p:sp>
         <p:nvSpPr>
-          <p:cNvPr id="2" name="Title 1"/>
+          <p:cNvPr id="2" name="Title 1">
+            <a:extLst>
+              <a:ext uri="{FF2B5EF4-FFF2-40B4-BE49-F238E27FC236}">
+                <a16:creationId xmlns:a16="http://schemas.microsoft.com/office/drawing/2014/main" id="{EEB44D3C-8A2F-377E-0D19-B0E8CCB8FC35}"/>
+              </a:ext>
+            </a:extLst>
+          </p:cNvPr>
           <p:cNvSpPr>
             <a:spLocks noGrp="1"/>
           </p:cNvSpPr>
@@ -41842,80 +42015,123 @@
           <a:lstStyle/>
           <a:p>
             <a:r>
-              <a:rPr lang="en-US"/>
-              <a:t>Procedure/Methodology</a:t>
-            </a:r>
-            <a:endParaRPr lang="en-US" dirty="0"/>
-          </a:p>
-        </p:txBody>
-      </p:sp>
-      <p:sp>
-        <p:nvSpPr>
-          <p:cNvPr id="3" name="Content Placeholder 2"/>
-          <p:cNvSpPr>
-            <a:spLocks noGrp="1"/>
-          </p:cNvSpPr>
-          <p:nvPr>
-            <p:ph idx="1"/>
-          </p:nvPr>
-        </p:nvSpPr>
-        <p:spPr/>
-        <p:txBody>
-          <a:bodyPr>
-            <a:normAutofit fontScale="77500" lnSpcReduction="20000"/>
-          </a:bodyPr>
-          <a:lstStyle/>
-          <a:p>
-            <a:pPr marL="0" indent="0">
-              <a:buNone/>
-            </a:pPr>
-            <a:r>
               <a:rPr lang="en-US" dirty="0"/>
-              <a:t>We have taken the following suggestive steps to build the model</a:t>
-            </a:r>
-          </a:p>
-          <a:p>
-            <a:r>
-              <a:rPr lang="en-US" dirty="0"/>
-              <a:t>Preprocess data (convert columns to appropriate formats, handle missing values, etc.)</a:t>
-            </a:r>
-          </a:p>
-          <a:p>
-            <a:r>
-              <a:rPr lang="en-US" dirty="0"/>
-              <a:t>Conduct appropriate exploratory analysis to extract useful insights (whether directly useful for business or for eventual modelling/feature engineering)</a:t>
-            </a:r>
-          </a:p>
-          <a:p>
-            <a:r>
-              <a:rPr lang="en-US" dirty="0"/>
-              <a:t>Derive new features</a:t>
-            </a:r>
-          </a:p>
-          <a:p>
-            <a:r>
-              <a:rPr lang="en-US" dirty="0"/>
-              <a:t>Train a variety of models, tune model hyperparameters, etc. (handle class imbalance using appropriate techniques such as Accuracy, Recall, Precision, F1score, F2Score)</a:t>
-            </a:r>
-          </a:p>
-          <a:p>
-            <a:r>
-              <a:rPr lang="en-US" dirty="0"/>
-              <a:t>Evaluate the models using appropriate evaluation metrics. Note that it is more important to identify churners than the non-churners accurately - choose an appropriate evaluation metric which reflects this business goal</a:t>
-            </a:r>
-          </a:p>
-          <a:p>
-            <a:r>
-              <a:rPr lang="en-US" dirty="0"/>
-              <a:t>Finally, choose a model based on some evaluation metric</a:t>
-            </a:r>
-          </a:p>
-        </p:txBody>
-      </p:sp>
+              <a:t>Steps of Processing</a:t>
+            </a:r>
+            <a:endParaRPr lang="en-AU" dirty="0"/>
+          </a:p>
+        </p:txBody>
+      </p:sp>
+      <p:pic>
+        <p:nvPicPr>
+          <p:cNvPr id="6" name="Picture 5">
+            <a:extLst>
+              <a:ext uri="{FF2B5EF4-FFF2-40B4-BE49-F238E27FC236}">
+                <a16:creationId xmlns:a16="http://schemas.microsoft.com/office/drawing/2014/main" id="{452F0C96-3B59-AF1D-906A-541B776BB42F}"/>
+              </a:ext>
+            </a:extLst>
+          </p:cNvPr>
+          <p:cNvPicPr>
+            <a:picLocks noChangeAspect="1"/>
+          </p:cNvPicPr>
+          <p:nvPr/>
+        </p:nvPicPr>
+        <p:blipFill>
+          <a:blip r:embed="rId2">
+            <a:extLst>
+              <a:ext uri="{28A0092B-C50C-407E-A947-70E740481C1C}">
+                <a14:useLocalDpi xmlns:a14="http://schemas.microsoft.com/office/drawing/2010/main" val="0"/>
+              </a:ext>
+            </a:extLst>
+          </a:blip>
+          <a:srcRect/>
+          <a:stretch>
+            <a:fillRect/>
+          </a:stretch>
+        </p:blipFill>
+        <p:spPr bwMode="auto">
+          <a:xfrm>
+            <a:off x="0" y="2502423"/>
+            <a:ext cx="4867275" cy="3867150"/>
+          </a:xfrm>
+          <a:prstGeom prst="rect">
+            <a:avLst/>
+          </a:prstGeom>
+          <a:noFill/>
+        </p:spPr>
+      </p:pic>
+      <p:pic>
+        <p:nvPicPr>
+          <p:cNvPr id="7" name="Picture 6">
+            <a:extLst>
+              <a:ext uri="{FF2B5EF4-FFF2-40B4-BE49-F238E27FC236}">
+                <a16:creationId xmlns:a16="http://schemas.microsoft.com/office/drawing/2014/main" id="{D86A47C2-DD16-B828-A998-2EB75F21030A}"/>
+              </a:ext>
+            </a:extLst>
+          </p:cNvPr>
+          <p:cNvPicPr>
+            <a:picLocks noChangeAspect="1"/>
+          </p:cNvPicPr>
+          <p:nvPr/>
+        </p:nvPicPr>
+        <p:blipFill>
+          <a:blip r:embed="rId3">
+            <a:extLst>
+              <a:ext uri="{28A0092B-C50C-407E-A947-70E740481C1C}">
+                <a14:useLocalDpi xmlns:a14="http://schemas.microsoft.com/office/drawing/2010/main" val="0"/>
+              </a:ext>
+            </a:extLst>
+          </a:blip>
+          <a:srcRect/>
+          <a:stretch>
+            <a:fillRect/>
+          </a:stretch>
+        </p:blipFill>
+        <p:spPr bwMode="auto">
+          <a:xfrm>
+            <a:off x="5630939" y="2502423"/>
+            <a:ext cx="6236970" cy="1600200"/>
+          </a:xfrm>
+          <a:prstGeom prst="rect">
+            <a:avLst/>
+          </a:prstGeom>
+          <a:noFill/>
+        </p:spPr>
+      </p:pic>
+      <p:pic>
+        <p:nvPicPr>
+          <p:cNvPr id="8" name="Picture 7">
+            <a:extLst>
+              <a:ext uri="{FF2B5EF4-FFF2-40B4-BE49-F238E27FC236}">
+                <a16:creationId xmlns:a16="http://schemas.microsoft.com/office/drawing/2014/main" id="{A795CD48-3475-2D47-CD00-B843BF205D21}"/>
+              </a:ext>
+            </a:extLst>
+          </p:cNvPr>
+          <p:cNvPicPr>
+            <a:picLocks noChangeAspect="1"/>
+          </p:cNvPicPr>
+          <p:nvPr/>
+        </p:nvPicPr>
+        <p:blipFill>
+          <a:blip r:embed="rId4"/>
+          <a:stretch>
+            <a:fillRect/>
+          </a:stretch>
+        </p:blipFill>
+        <p:spPr>
+          <a:xfrm>
+            <a:off x="6458770" y="4349091"/>
+            <a:ext cx="3672840" cy="2118360"/>
+          </a:xfrm>
+          <a:prstGeom prst="rect">
+            <a:avLst/>
+          </a:prstGeom>
+        </p:spPr>
+      </p:pic>
     </p:spTree>
     <p:extLst>
       <p:ext uri="{BB962C8B-B14F-4D97-AF65-F5344CB8AC3E}">
-        <p14:creationId xmlns:p14="http://schemas.microsoft.com/office/powerpoint/2010/main" val="1575721539"/>
+        <p14:creationId xmlns:p14="http://schemas.microsoft.com/office/powerpoint/2010/main" val="280790843"/>
       </p:ext>
     </p:extLst>
   </p:cSld>

</xml_diff>